<commit_message>
Removed techniques, shaders, programs and added Metal Roughness to Core Spec
</commit_message>
<xml_diff>
--- a/specification/2.0/figures/pptx/figures.pptx
+++ b/specification/2.0/figures/pptx/figures.pptx
@@ -5,15 +5,16 @@
     <p:sldMasterId id="2147483728" r:id="rId1"/>
   </p:sldMasterIdLst>
   <p:notesMasterIdLst>
-    <p:notesMasterId r:id="rId5"/>
+    <p:notesMasterId r:id="rId6"/>
   </p:notesMasterIdLst>
   <p:handoutMasterIdLst>
-    <p:handoutMasterId r:id="rId6"/>
+    <p:handoutMasterId r:id="rId7"/>
   </p:handoutMasterIdLst>
   <p:sldIdLst>
     <p:sldId id="3181" r:id="rId2"/>
     <p:sldId id="3168" r:id="rId3"/>
     <p:sldId id="3182" r:id="rId4"/>
+    <p:sldId id="3183" r:id="rId5"/>
   </p:sldIdLst>
   <p:sldSz cx="10972800" cy="6172200"/>
   <p:notesSz cx="6858000" cy="9144000"/>
@@ -187,7 +188,7 @@
 
 <file path=ppt/commentAuthors.xml><?xml version="1.0" encoding="utf-8"?>
 <p:cmAuthorLst xmlns:a="http://schemas.openxmlformats.org/drawingml/2006/main" xmlns:r="http://schemas.openxmlformats.org/officeDocument/2006/relationships" xmlns:p="http://schemas.openxmlformats.org/presentationml/2006/main">
-  <p:cmAuthor id="1" name="Автор" initials="A" lastIdx="0" clrIdx="1"/>
+  <p:cmAuthor id="2" name="Author" initials="A" lastIdx="0" clrIdx="2"/>
 </p:cmAuthorLst>
 </file>
 
@@ -309,7 +310,7 @@
               <a:pPr>
                 <a:defRPr/>
               </a:pPr>
-              <a:t>9/24/2016</a:t>
+              <a:t>2/3/2017</a:t>
             </a:fld>
             <a:endParaRPr lang="en-US"/>
           </a:p>
@@ -525,7 +526,7 @@
               <a:pPr>
                 <a:defRPr/>
               </a:pPr>
-              <a:t>9/24/2016</a:t>
+              <a:t>2/3/2017</a:t>
             </a:fld>
             <a:endParaRPr lang="en-US"/>
           </a:p>
@@ -561,7 +562,7 @@
           <a:lstStyle/>
           <a:p>
             <a:pPr lvl="0"/>
-            <a:endParaRPr lang="en-US" noProof="0" smtClean="0"/>
+            <a:endParaRPr lang="en-US" noProof="0"/>
           </a:p>
         </p:txBody>
       </p:sp>
@@ -592,35 +593,35 @@
           <a:p>
             <a:pPr lvl="0"/>
             <a:r>
-              <a:rPr lang="en-US" noProof="0" smtClean="0"/>
+              <a:rPr lang="en-US" noProof="0"/>
               <a:t>Click to edit Master text styles</a:t>
             </a:r>
           </a:p>
           <a:p>
             <a:pPr lvl="1"/>
             <a:r>
-              <a:rPr lang="en-US" noProof="0" smtClean="0"/>
+              <a:rPr lang="en-US" noProof="0"/>
               <a:t>Second level</a:t>
             </a:r>
           </a:p>
           <a:p>
             <a:pPr lvl="2"/>
             <a:r>
-              <a:rPr lang="en-US" noProof="0" smtClean="0"/>
+              <a:rPr lang="en-US" noProof="0"/>
               <a:t>Third level</a:t>
             </a:r>
           </a:p>
           <a:p>
             <a:pPr lvl="3"/>
             <a:r>
-              <a:rPr lang="en-US" noProof="0" smtClean="0"/>
+              <a:rPr lang="en-US" noProof="0"/>
               <a:t>Fourth level</a:t>
             </a:r>
           </a:p>
           <a:p>
             <a:pPr lvl="4"/>
             <a:r>
-              <a:rPr lang="en-US" noProof="0" smtClean="0"/>
+              <a:rPr lang="en-US" noProof="0"/>
               <a:t>Fifth level</a:t>
             </a:r>
           </a:p>
@@ -1076,13 +1077,6 @@
   <p:transition>
     <p:fade/>
   </p:transition>
-  <p:timing>
-    <p:tnLst>
-      <p:par>
-        <p:cTn id="1" dur="indefinite" restart="never" nodeType="tmRoot"/>
-      </p:par>
-    </p:tnLst>
-  </p:timing>
 </p:sldLayout>
 </file>
 
@@ -1170,7 +1164,7 @@
                 <a:tab pos="6553200" algn="l"/>
               </a:tabLst>
             </a:pPr>
-            <a:endParaRPr kumimoji="0" lang="en-US" sz="3600" b="0" i="0" u="none" strike="noStrike" cap="none" normalizeH="0" baseline="0" smtClean="0">
+            <a:endParaRPr kumimoji="0" lang="en-US" sz="3600" b="0" i="0" u="none" strike="noStrike" cap="none" normalizeH="0" baseline="0">
               <a:ln>
                 <a:noFill/>
               </a:ln>
@@ -1243,10 +1237,9 @@
           </a:lstStyle>
           <a:p>
             <a:r>
-              <a:rPr lang="en-US" dirty="0" smtClean="0"/>
+              <a:rPr lang="en-US" dirty="0"/>
               <a:t>Click to edit Master title style</a:t>
             </a:r>
-            <a:endParaRPr lang="en-US" dirty="0"/>
           </a:p>
         </p:txBody>
       </p:sp>
@@ -1318,38 +1311,37 @@
           <a:p>
             <a:pPr lvl="0"/>
             <a:r>
-              <a:rPr lang="en-US" dirty="0" smtClean="0"/>
+              <a:rPr lang="en-US" dirty="0"/>
               <a:t>Click to edit Master text styles</a:t>
             </a:r>
           </a:p>
           <a:p>
             <a:pPr lvl="1"/>
             <a:r>
-              <a:rPr lang="en-US" dirty="0" smtClean="0"/>
+              <a:rPr lang="en-US" dirty="0"/>
               <a:t>Second level</a:t>
             </a:r>
           </a:p>
           <a:p>
             <a:pPr lvl="2"/>
             <a:r>
-              <a:rPr lang="en-US" dirty="0" smtClean="0"/>
+              <a:rPr lang="en-US" dirty="0"/>
               <a:t>Third level</a:t>
             </a:r>
           </a:p>
           <a:p>
             <a:pPr lvl="3"/>
             <a:r>
-              <a:rPr lang="en-US" dirty="0" smtClean="0"/>
+              <a:rPr lang="en-US" dirty="0"/>
               <a:t>Fourth level</a:t>
             </a:r>
           </a:p>
           <a:p>
             <a:pPr lvl="4"/>
             <a:r>
-              <a:rPr lang="en-US" dirty="0" smtClean="0"/>
+              <a:rPr lang="en-US" dirty="0"/>
               <a:t>Fifth level</a:t>
             </a:r>
-            <a:endParaRPr lang="en-US" dirty="0"/>
           </a:p>
         </p:txBody>
       </p:sp>
@@ -1361,13 +1353,6 @@
   <p:transition>
     <p:fade/>
   </p:transition>
-  <p:timing>
-    <p:tnLst>
-      <p:par>
-        <p:cTn id="1" dur="indefinite" restart="never" nodeType="tmRoot"/>
-      </p:par>
-    </p:tnLst>
-  </p:timing>
 </p:sldLayout>
 </file>
 
@@ -1426,10 +1411,9 @@
           <a:p>
             <a:pPr lvl="0"/>
             <a:r>
-              <a:rPr lang="en-US" dirty="0" smtClean="0"/>
+              <a:rPr lang="en-US" dirty="0"/>
               <a:t>Click to edit Master title style</a:t>
             </a:r>
-            <a:endParaRPr lang="en-US" dirty="0"/>
           </a:p>
         </p:txBody>
       </p:sp>
@@ -1506,38 +1490,37 @@
           <a:p>
             <a:pPr lvl="0"/>
             <a:r>
-              <a:rPr lang="en-US" dirty="0" smtClean="0"/>
+              <a:rPr lang="en-US" dirty="0"/>
               <a:t>Click to edit Master text styles</a:t>
             </a:r>
           </a:p>
           <a:p>
             <a:pPr lvl="1"/>
             <a:r>
-              <a:rPr lang="en-US" dirty="0" smtClean="0"/>
+              <a:rPr lang="en-US" dirty="0"/>
               <a:t>Second level</a:t>
             </a:r>
           </a:p>
           <a:p>
             <a:pPr lvl="2"/>
             <a:r>
-              <a:rPr lang="en-US" dirty="0" smtClean="0"/>
+              <a:rPr lang="en-US" dirty="0"/>
               <a:t>Third level</a:t>
             </a:r>
           </a:p>
           <a:p>
             <a:pPr lvl="3"/>
             <a:r>
-              <a:rPr lang="en-US" dirty="0" smtClean="0"/>
+              <a:rPr lang="en-US" dirty="0"/>
               <a:t>Fourth level</a:t>
             </a:r>
           </a:p>
           <a:p>
             <a:pPr lvl="4"/>
             <a:r>
-              <a:rPr lang="en-US" dirty="0" smtClean="0"/>
+              <a:rPr lang="en-US" dirty="0"/>
               <a:t>Fifth level</a:t>
             </a:r>
-            <a:endParaRPr lang="en-US" dirty="0"/>
           </a:p>
         </p:txBody>
       </p:sp>
@@ -1608,7 +1591,7 @@
                 <a:tab pos="6553200" algn="l"/>
               </a:tabLst>
             </a:pPr>
-            <a:endParaRPr kumimoji="0" lang="en-US" sz="3600" b="0" i="0" u="none" strike="noStrike" cap="none" normalizeH="0" baseline="0" smtClean="0">
+            <a:endParaRPr kumimoji="0" lang="en-US" sz="3600" b="0" i="0" u="none" strike="noStrike" cap="none" normalizeH="0" baseline="0">
               <a:ln>
                 <a:noFill/>
               </a:ln>
@@ -1666,13 +1649,6 @@
   <p:transition>
     <p:fade/>
   </p:transition>
-  <p:timing>
-    <p:tnLst>
-      <p:par>
-        <p:cTn id="1" dur="indefinite" restart="never" nodeType="tmRoot"/>
-      </p:par>
-    </p:tnLst>
-  </p:timing>
 </p:sldLayout>
 </file>
 
@@ -1738,7 +1714,7 @@
           <a:p>
             <a:pPr lvl="0"/>
             <a:r>
-              <a:rPr lang="en-US" dirty="0" smtClean="0"/>
+              <a:rPr lang="en-US" dirty="0"/>
               <a:t>Click to edit Master title style</a:t>
             </a:r>
           </a:p>
@@ -1780,35 +1756,35 @@
           <a:p>
             <a:pPr lvl="0"/>
             <a:r>
-              <a:rPr lang="en-US" dirty="0" smtClean="0"/>
+              <a:rPr lang="en-US" dirty="0"/>
               <a:t>Click to edit Master text styles</a:t>
             </a:r>
           </a:p>
           <a:p>
             <a:pPr lvl="1"/>
             <a:r>
-              <a:rPr lang="en-US" dirty="0" smtClean="0"/>
+              <a:rPr lang="en-US" dirty="0"/>
               <a:t>Second level</a:t>
             </a:r>
           </a:p>
           <a:p>
             <a:pPr lvl="2"/>
             <a:r>
-              <a:rPr lang="en-US" dirty="0" smtClean="0"/>
+              <a:rPr lang="en-US" dirty="0"/>
               <a:t>Third level</a:t>
             </a:r>
           </a:p>
           <a:p>
             <a:pPr lvl="3"/>
             <a:r>
-              <a:rPr lang="en-US" dirty="0" smtClean="0"/>
+              <a:rPr lang="en-US" dirty="0"/>
               <a:t>Fourth level</a:t>
             </a:r>
           </a:p>
           <a:p>
             <a:pPr lvl="4"/>
             <a:r>
-              <a:rPr lang="en-US" dirty="0" smtClean="0"/>
+              <a:rPr lang="en-US" dirty="0"/>
               <a:t>Fifth level</a:t>
             </a:r>
           </a:p>
@@ -1850,13 +1826,22 @@
               <a:defRPr/>
             </a:pPr>
             <a:r>
-              <a:rPr lang="en-US" sz="1000" b="1" dirty="0" smtClean="0">
+              <a:rPr lang="en-US" sz="1000" b="1" dirty="0">
                 <a:solidFill>
                   <a:schemeClr val="bg2"/>
                 </a:solidFill>
                 <a:latin typeface="Trebuchet MS" pitchFamily="34" charset="0"/>
               </a:rPr>
-              <a:t>© </a:t>
+              <a:t>© Copyright Khronos Group</a:t>
+            </a:r>
+            <a:r>
+              <a:rPr lang="en-US" sz="1000" b="1" baseline="0" dirty="0">
+                <a:solidFill>
+                  <a:schemeClr val="bg2"/>
+                </a:solidFill>
+                <a:latin typeface="Trebuchet MS" pitchFamily="34" charset="0"/>
+              </a:rPr>
+              <a:t> </a:t>
             </a:r>
             <a:r>
               <a:rPr lang="en-US" sz="1000" b="1" dirty="0">
@@ -1865,43 +1850,7 @@
                 </a:solidFill>
                 <a:latin typeface="Trebuchet MS" pitchFamily="34" charset="0"/>
               </a:rPr>
-              <a:t>Copyright Khronos </a:t>
-            </a:r>
-            <a:r>
-              <a:rPr lang="en-US" sz="1000" b="1" dirty="0" smtClean="0">
-                <a:solidFill>
-                  <a:schemeClr val="bg2"/>
-                </a:solidFill>
-                <a:latin typeface="Trebuchet MS" pitchFamily="34" charset="0"/>
-              </a:rPr>
-              <a:t>Group</a:t>
-            </a:r>
-            <a:r>
-              <a:rPr lang="en-US" sz="1000" b="1" baseline="0" dirty="0" smtClean="0">
-                <a:solidFill>
-                  <a:schemeClr val="bg2"/>
-                </a:solidFill>
-                <a:latin typeface="Trebuchet MS" pitchFamily="34" charset="0"/>
-              </a:rPr>
-              <a:t> </a:t>
-            </a:r>
-            <a:r>
-              <a:rPr lang="en-US" sz="1000" b="1" dirty="0" smtClean="0">
-                <a:solidFill>
-                  <a:schemeClr val="bg2"/>
-                </a:solidFill>
-                <a:latin typeface="Trebuchet MS" pitchFamily="34" charset="0"/>
-              </a:rPr>
-              <a:t>2015 </a:t>
-            </a:r>
-            <a:r>
-              <a:rPr lang="en-US" sz="1000" b="1" dirty="0">
-                <a:solidFill>
-                  <a:schemeClr val="bg2"/>
-                </a:solidFill>
-                <a:latin typeface="Trebuchet MS" pitchFamily="34" charset="0"/>
-              </a:rPr>
-              <a:t>- Page </a:t>
+              <a:t>2015 - Page </a:t>
             </a:r>
             <a:fld id="{9539ED03-2A5D-463F-9377-F8D7665AFEA6}" type="slidenum">
               <a:rPr lang="en-US" sz="1000" b="1">
@@ -1938,13 +1887,6 @@
   <p:transition>
     <p:fade/>
   </p:transition>
-  <p:timing>
-    <p:tnLst>
-      <p:par>
-        <p:cTn id="1" dur="indefinite" restart="never" nodeType="tmRoot"/>
-      </p:par>
-    </p:tnLst>
-  </p:timing>
   <p:txStyles>
     <p:titleStyle>
       <a:lvl1pPr algn="l" defTabSz="978105" rtl="0" eaLnBrk="0" fontAlgn="base" hangingPunct="0">
@@ -2488,7 +2430,7 @@
               </a:lnSpc>
             </a:pPr>
             <a:r>
-              <a:rPr lang="en-US" sz="1620" b="1" dirty="0" smtClean="0">
+              <a:rPr lang="en-US" sz="1620" b="1" dirty="0">
                 <a:solidFill>
                   <a:schemeClr val="tx1"/>
                 </a:solidFill>
@@ -2533,25 +2475,8 @@
                 <a:latin typeface="Trebuchet MS"/>
                 <a:cs typeface="Trebuchet MS"/>
               </a:rPr>
-              <a:t>Node hierarchy, materials, </a:t>
+              <a:t>Node hierarchy, materials, cameras</a:t>
             </a:r>
-            <a:r>
-              <a:rPr lang="en-US" sz="1260" b="1" dirty="0" smtClean="0">
-                <a:solidFill>
-                  <a:schemeClr val="tx1"/>
-                </a:solidFill>
-                <a:latin typeface="Trebuchet MS"/>
-                <a:cs typeface="Trebuchet MS"/>
-              </a:rPr>
-              <a:t>cameras</a:t>
-            </a:r>
-            <a:endParaRPr lang="en-US" sz="1260" b="1" dirty="0">
-              <a:solidFill>
-                <a:schemeClr val="tx1"/>
-              </a:solidFill>
-              <a:latin typeface="Trebuchet MS"/>
-              <a:cs typeface="Trebuchet MS"/>
-            </a:endParaRPr>
           </a:p>
         </p:txBody>
       </p:sp>
@@ -2564,7 +2489,7 @@
         <p:spPr bwMode="auto">
           <a:xfrm>
             <a:off x="6096000" y="4511040"/>
-            <a:ext cx="2686050" cy="1303020"/>
+            <a:ext cx="3276600" cy="1303020"/>
           </a:xfrm>
           <a:prstGeom prst="roundRect">
             <a:avLst/>
@@ -2676,116 +2601,7 @@
                 <a:latin typeface="Trebuchet MS"/>
                 <a:cs typeface="Trebuchet MS"/>
               </a:rPr>
-              <a:t>Skins: inverse-bind </a:t>
-            </a:r>
-            <a:r>
-              <a:rPr lang="en-US" sz="1260" b="1" dirty="0" smtClean="0">
-                <a:solidFill>
-                  <a:schemeClr val="tx1"/>
-                </a:solidFill>
-                <a:latin typeface="Trebuchet MS"/>
-                <a:cs typeface="Trebuchet MS"/>
-              </a:rPr>
-              <a:t>matrices</a:t>
-            </a:r>
-            <a:endParaRPr lang="en-US" sz="1260" b="1" dirty="0">
-              <a:solidFill>
-                <a:schemeClr val="tx1"/>
-              </a:solidFill>
-              <a:latin typeface="Trebuchet MS"/>
-              <a:cs typeface="Trebuchet MS"/>
-            </a:endParaRPr>
-          </a:p>
-        </p:txBody>
-      </p:sp>
-      <p:sp>
-        <p:nvSpPr>
-          <p:cNvPr id="15" name="Rounded Rectangle 14"/>
-          <p:cNvSpPr/>
-          <p:nvPr/>
-        </p:nvSpPr>
-        <p:spPr bwMode="auto">
-          <a:xfrm>
-            <a:off x="8849686" y="4511040"/>
-            <a:ext cx="941070" cy="1303020"/>
-          </a:xfrm>
-          <a:prstGeom prst="roundRect">
-            <a:avLst/>
-          </a:prstGeom>
-          <a:solidFill>
-            <a:srgbClr val="EFFFEF"/>
-          </a:solidFill>
-          <a:ln w="9525" cap="flat" cmpd="sng" algn="ctr">
-            <a:solidFill>
-              <a:schemeClr val="tx1"/>
-            </a:solidFill>
-            <a:prstDash val="solid"/>
-            <a:round/>
-            <a:headEnd type="none" w="med" len="med"/>
-            <a:tailEnd type="none" w="med" len="med"/>
-          </a:ln>
-          <a:effectLst/>
-        </p:spPr>
-        <p:txBody>
-          <a:bodyPr vert="horz" wrap="square" lIns="82296" tIns="41148" rIns="82296" bIns="41148" numCol="1" rtlCol="0" anchor="t" anchorCtr="0" compatLnSpc="1">
-            <a:prstTxWarp prst="textNoShape">
-              <a:avLst/>
-            </a:prstTxWarp>
-          </a:bodyPr>
-          <a:lstStyle/>
-          <a:p>
-            <a:pPr algn="ctr" defTabSz="822960" eaLnBrk="0" hangingPunct="0">
-              <a:lnSpc>
-                <a:spcPct val="100000"/>
-              </a:lnSpc>
-            </a:pPr>
-            <a:r>
-              <a:rPr lang="en-US" sz="1620" b="1" dirty="0">
-                <a:solidFill>
-                  <a:schemeClr val="tx1"/>
-                </a:solidFill>
-                <a:latin typeface="Trebuchet MS"/>
-                <a:cs typeface="Trebuchet MS"/>
-              </a:rPr>
-              <a:t>.glsl</a:t>
-            </a:r>
-            <a:endParaRPr lang="en-US" sz="700" b="1" dirty="0">
-              <a:solidFill>
-                <a:schemeClr val="tx1"/>
-              </a:solidFill>
-              <a:latin typeface="Trebuchet MS"/>
-              <a:cs typeface="Trebuchet MS"/>
-            </a:endParaRPr>
-          </a:p>
-          <a:p>
-            <a:pPr algn="ctr" defTabSz="822960" eaLnBrk="0" hangingPunct="0">
-              <a:lnSpc>
-                <a:spcPct val="100000"/>
-              </a:lnSpc>
-            </a:pPr>
-            <a:endParaRPr lang="en-US" sz="600" b="1" dirty="0">
-              <a:solidFill>
-                <a:schemeClr val="tx1"/>
-              </a:solidFill>
-              <a:latin typeface="Trebuchet MS"/>
-              <a:cs typeface="Trebuchet MS"/>
-            </a:endParaRPr>
-          </a:p>
-          <a:p>
-            <a:pPr algn="ctr" defTabSz="822960" eaLnBrk="0" hangingPunct="0">
-              <a:lnSpc>
-                <a:spcPct val="100000"/>
-              </a:lnSpc>
-            </a:pPr>
-            <a:r>
-              <a:rPr lang="en-US" sz="1260" b="1" dirty="0">
-                <a:solidFill>
-                  <a:schemeClr val="tx1"/>
-                </a:solidFill>
-                <a:latin typeface="Trebuchet MS"/>
-                <a:cs typeface="Trebuchet MS"/>
-              </a:rPr>
-              <a:t>Shaders</a:t>
+              <a:t>Skins: inverse-bind matrices</a:t>
             </a:r>
           </a:p>
         </p:txBody>
@@ -2798,8 +2614,8 @@
         </p:nvSpPr>
         <p:spPr bwMode="auto">
           <a:xfrm>
-            <a:off x="9837420" y="4511040"/>
-            <a:ext cx="925830" cy="1303020"/>
+            <a:off x="9448800" y="4511040"/>
+            <a:ext cx="1314450" cy="1303020"/>
           </a:xfrm>
           <a:prstGeom prst="roundRect">
             <a:avLst/>
@@ -2839,25 +2655,8 @@
                 <a:latin typeface="Trebuchet MS"/>
                 <a:cs typeface="Trebuchet MS"/>
               </a:rPr>
-              <a:t>.</a:t>
+              <a:t>.png</a:t>
             </a:r>
-            <a:r>
-              <a:rPr lang="en-US" sz="1620" b="1" dirty="0" smtClean="0">
-                <a:solidFill>
-                  <a:schemeClr val="tx1"/>
-                </a:solidFill>
-                <a:latin typeface="Trebuchet MS"/>
-                <a:cs typeface="Trebuchet MS"/>
-              </a:rPr>
-              <a:t>png</a:t>
-            </a:r>
-            <a:endParaRPr lang="en-US" sz="1620" b="1" dirty="0">
-              <a:solidFill>
-                <a:schemeClr val="tx1"/>
-              </a:solidFill>
-              <a:latin typeface="Trebuchet MS"/>
-              <a:cs typeface="Trebuchet MS"/>
-            </a:endParaRPr>
           </a:p>
           <a:p>
             <a:pPr algn="ctr" defTabSz="822960" eaLnBrk="0" hangingPunct="0">
@@ -2866,7 +2665,7 @@
               </a:lnSpc>
             </a:pPr>
             <a:r>
-              <a:rPr lang="en-US" sz="1620" b="1" dirty="0" smtClean="0">
+              <a:rPr lang="en-US" sz="1620" b="1" dirty="0">
                 <a:solidFill>
                   <a:schemeClr val="tx1"/>
                 </a:solidFill>
@@ -2883,7 +2682,7 @@
               </a:lnSpc>
             </a:pPr>
             <a:r>
-              <a:rPr lang="en-US" sz="1620" b="1" dirty="0" smtClean="0">
+              <a:rPr lang="en-US" sz="1620" b="1" dirty="0">
                 <a:solidFill>
                   <a:schemeClr val="tx1"/>
                 </a:solidFill>
@@ -2946,13 +2745,6 @@
   <p:transition spd="slow">
     <p:strips dir="rd"/>
   </p:transition>
-  <p:timing>
-    <p:tnLst>
-      <p:par>
-        <p:cTn id="1" dur="indefinite" restart="never" nodeType="tmRoot"/>
-      </p:par>
-    </p:tnLst>
-  </p:timing>
 </p:sld>
 </file>
 
@@ -3690,66 +3482,6 @@
       </p:cxnSp>
       <p:sp>
         <p:nvSpPr>
-          <p:cNvPr id="23" name="Rounded Rectangle 22"/>
-          <p:cNvSpPr/>
-          <p:nvPr/>
-        </p:nvSpPr>
-        <p:spPr>
-          <a:xfrm>
-            <a:off x="6102171" y="3958423"/>
-            <a:ext cx="964513" cy="360932"/>
-          </a:xfrm>
-          <a:prstGeom prst="roundRect">
-            <a:avLst>
-              <a:gd name="adj" fmla="val 50000"/>
-            </a:avLst>
-          </a:prstGeom>
-          <a:solidFill>
-            <a:srgbClr val="EAEAFA"/>
-          </a:solidFill>
-          <a:ln>
-            <a:solidFill>
-              <a:schemeClr val="bg1">
-                <a:lumMod val="85000"/>
-              </a:schemeClr>
-            </a:solidFill>
-          </a:ln>
-          <a:effectLst/>
-        </p:spPr>
-        <p:style>
-          <a:lnRef idx="1">
-            <a:schemeClr val="accent1"/>
-          </a:lnRef>
-          <a:fillRef idx="3">
-            <a:schemeClr val="accent1"/>
-          </a:fillRef>
-          <a:effectRef idx="2">
-            <a:schemeClr val="accent1"/>
-          </a:effectRef>
-          <a:fontRef idx="minor">
-            <a:schemeClr val="lt1"/>
-          </a:fontRef>
-        </p:style>
-        <p:txBody>
-          <a:bodyPr lIns="82296" tIns="41148" rIns="82296" bIns="41148" spcCol="0" rtlCol="0" anchor="ctr"/>
-          <a:lstStyle/>
-          <a:p>
-            <a:pPr algn="ctr"/>
-            <a:r>
-              <a:rPr lang="en-US" sz="1100" b="1" dirty="0">
-                <a:solidFill>
-                  <a:schemeClr val="tx1"/>
-                </a:solidFill>
-                <a:latin typeface="Trebuchet MS"/>
-                <a:cs typeface="Trebuchet MS"/>
-              </a:rPr>
-              <a:t>technique</a:t>
-            </a:r>
-          </a:p>
-        </p:txBody>
-      </p:sp>
-      <p:sp>
-        <p:nvSpPr>
           <p:cNvPr id="24" name="Rounded Rectangle 23"/>
           <p:cNvSpPr/>
           <p:nvPr/>
@@ -3808,46 +3540,6 @@
           </a:p>
         </p:txBody>
       </p:sp>
-      <p:cxnSp>
-        <p:nvCxnSpPr>
-          <p:cNvPr id="25" name="Straight Arrow Connector 24"/>
-          <p:cNvCxnSpPr>
-            <a:stCxn id="21" idx="2"/>
-            <a:endCxn id="23" idx="0"/>
-          </p:cNvCxnSpPr>
-          <p:nvPr/>
-        </p:nvCxnSpPr>
-        <p:spPr>
-          <a:xfrm flipH="1">
-            <a:off x="6584428" y="3455432"/>
-            <a:ext cx="1970" cy="502991"/>
-          </a:xfrm>
-          <a:prstGeom prst="straightConnector1">
-            <a:avLst/>
-          </a:prstGeom>
-          <a:ln>
-            <a:solidFill>
-              <a:schemeClr val="tx1"/>
-            </a:solidFill>
-            <a:tailEnd type="arrow"/>
-          </a:ln>
-          <a:effectLst/>
-        </p:spPr>
-        <p:style>
-          <a:lnRef idx="2">
-            <a:schemeClr val="accent1"/>
-          </a:lnRef>
-          <a:fillRef idx="0">
-            <a:schemeClr val="accent1"/>
-          </a:fillRef>
-          <a:effectRef idx="1">
-            <a:schemeClr val="accent1"/>
-          </a:effectRef>
-          <a:fontRef idx="minor">
-            <a:schemeClr val="tx1"/>
-          </a:fontRef>
-        </p:style>
-      </p:cxnSp>
       <p:cxnSp>
         <p:nvCxnSpPr>
           <p:cNvPr id="26" name="Straight Arrow Connector 25"/>
@@ -4127,202 +3819,6 @@
           </a:fontRef>
         </p:style>
       </p:cxnSp>
-      <p:sp>
-        <p:nvSpPr>
-          <p:cNvPr id="32" name="Rounded Rectangle 31"/>
-          <p:cNvSpPr/>
-          <p:nvPr/>
-        </p:nvSpPr>
-        <p:spPr>
-          <a:xfrm>
-            <a:off x="6102171" y="4770120"/>
-            <a:ext cx="964513" cy="360932"/>
-          </a:xfrm>
-          <a:prstGeom prst="roundRect">
-            <a:avLst>
-              <a:gd name="adj" fmla="val 50000"/>
-            </a:avLst>
-          </a:prstGeom>
-          <a:solidFill>
-            <a:srgbClr val="EAEAFA"/>
-          </a:solidFill>
-          <a:ln>
-            <a:solidFill>
-              <a:schemeClr val="bg1">
-                <a:lumMod val="85000"/>
-              </a:schemeClr>
-            </a:solidFill>
-          </a:ln>
-          <a:effectLst/>
-        </p:spPr>
-        <p:style>
-          <a:lnRef idx="1">
-            <a:schemeClr val="accent1"/>
-          </a:lnRef>
-          <a:fillRef idx="3">
-            <a:schemeClr val="accent1"/>
-          </a:fillRef>
-          <a:effectRef idx="2">
-            <a:schemeClr val="accent1"/>
-          </a:effectRef>
-          <a:fontRef idx="minor">
-            <a:schemeClr val="lt1"/>
-          </a:fontRef>
-        </p:style>
-        <p:txBody>
-          <a:bodyPr lIns="82296" tIns="41148" rIns="82296" bIns="41148" spcCol="0" rtlCol="0" anchor="ctr"/>
-          <a:lstStyle/>
-          <a:p>
-            <a:pPr algn="ctr"/>
-            <a:r>
-              <a:rPr lang="en-US" sz="1260" b="1" dirty="0">
-                <a:solidFill>
-                  <a:schemeClr val="tx1"/>
-                </a:solidFill>
-                <a:latin typeface="Trebuchet MS"/>
-                <a:cs typeface="Trebuchet MS"/>
-              </a:rPr>
-              <a:t>program</a:t>
-            </a:r>
-          </a:p>
-        </p:txBody>
-      </p:sp>
-      <p:cxnSp>
-        <p:nvCxnSpPr>
-          <p:cNvPr id="33" name="Straight Arrow Connector 32"/>
-          <p:cNvCxnSpPr>
-            <a:stCxn id="23" idx="2"/>
-            <a:endCxn id="32" idx="0"/>
-          </p:cNvCxnSpPr>
-          <p:nvPr/>
-        </p:nvCxnSpPr>
-        <p:spPr>
-          <a:xfrm>
-            <a:off x="6584427" y="4319355"/>
-            <a:ext cx="0" cy="450765"/>
-          </a:xfrm>
-          <a:prstGeom prst="straightConnector1">
-            <a:avLst/>
-          </a:prstGeom>
-          <a:ln>
-            <a:solidFill>
-              <a:schemeClr val="tx1"/>
-            </a:solidFill>
-            <a:tailEnd type="arrow"/>
-          </a:ln>
-          <a:effectLst/>
-        </p:spPr>
-        <p:style>
-          <a:lnRef idx="2">
-            <a:schemeClr val="accent1"/>
-          </a:lnRef>
-          <a:fillRef idx="0">
-            <a:schemeClr val="accent1"/>
-          </a:fillRef>
-          <a:effectRef idx="1">
-            <a:schemeClr val="accent1"/>
-          </a:effectRef>
-          <a:fontRef idx="minor">
-            <a:schemeClr val="tx1"/>
-          </a:fontRef>
-        </p:style>
-      </p:cxnSp>
-      <p:sp>
-        <p:nvSpPr>
-          <p:cNvPr id="34" name="Rounded Rectangle 33"/>
-          <p:cNvSpPr/>
-          <p:nvPr/>
-        </p:nvSpPr>
-        <p:spPr>
-          <a:xfrm>
-            <a:off x="6057248" y="5497362"/>
-            <a:ext cx="1040193" cy="360932"/>
-          </a:xfrm>
-          <a:prstGeom prst="roundRect">
-            <a:avLst>
-              <a:gd name="adj" fmla="val 50000"/>
-            </a:avLst>
-          </a:prstGeom>
-          <a:solidFill>
-            <a:srgbClr val="CCFFCC"/>
-          </a:solidFill>
-          <a:ln>
-            <a:noFill/>
-          </a:ln>
-          <a:effectLst/>
-        </p:spPr>
-        <p:style>
-          <a:lnRef idx="1">
-            <a:schemeClr val="accent1"/>
-          </a:lnRef>
-          <a:fillRef idx="3">
-            <a:schemeClr val="accent1"/>
-          </a:fillRef>
-          <a:effectRef idx="2">
-            <a:schemeClr val="accent1"/>
-          </a:effectRef>
-          <a:fontRef idx="minor">
-            <a:schemeClr val="lt1"/>
-          </a:fontRef>
-        </p:style>
-        <p:txBody>
-          <a:bodyPr lIns="82296" tIns="41148" rIns="82296" bIns="41148" spcCol="0" rtlCol="0" anchor="ctr"/>
-          <a:lstStyle/>
-          <a:p>
-            <a:pPr algn="ctr"/>
-            <a:r>
-              <a:rPr lang="en-US" sz="1260" b="1" dirty="0">
-                <a:solidFill>
-                  <a:schemeClr val="tx1"/>
-                </a:solidFill>
-                <a:latin typeface="Trebuchet MS"/>
-                <a:cs typeface="Trebuchet MS"/>
-              </a:rPr>
-              <a:t>shader</a:t>
-            </a:r>
-          </a:p>
-        </p:txBody>
-      </p:sp>
-      <p:cxnSp>
-        <p:nvCxnSpPr>
-          <p:cNvPr id="35" name="Straight Arrow Connector 34"/>
-          <p:cNvCxnSpPr>
-            <a:stCxn id="32" idx="2"/>
-            <a:endCxn id="34" idx="0"/>
-          </p:cNvCxnSpPr>
-          <p:nvPr/>
-        </p:nvCxnSpPr>
-        <p:spPr>
-          <a:xfrm flipH="1">
-            <a:off x="6577345" y="5131051"/>
-            <a:ext cx="7082" cy="366311"/>
-          </a:xfrm>
-          <a:prstGeom prst="straightConnector1">
-            <a:avLst/>
-          </a:prstGeom>
-          <a:ln>
-            <a:solidFill>
-              <a:schemeClr val="tx1"/>
-            </a:solidFill>
-            <a:tailEnd type="arrow"/>
-          </a:ln>
-          <a:effectLst/>
-        </p:spPr>
-        <p:style>
-          <a:lnRef idx="2">
-            <a:schemeClr val="accent1"/>
-          </a:lnRef>
-          <a:fillRef idx="0">
-            <a:schemeClr val="accent1"/>
-          </a:fillRef>
-          <a:effectRef idx="1">
-            <a:schemeClr val="accent1"/>
-          </a:effectRef>
-          <a:fontRef idx="minor">
-            <a:schemeClr val="tx1"/>
-          </a:fontRef>
-        </p:style>
-      </p:cxnSp>
       <p:cxnSp>
         <p:nvCxnSpPr>
           <p:cNvPr id="36" name="Straight Arrow Connector 35"/>
@@ -4401,42 +3897,6 @@
       </p:sp>
       <p:sp>
         <p:nvSpPr>
-          <p:cNvPr id="40" name="TextBox 39"/>
-          <p:cNvSpPr txBox="1"/>
-          <p:nvPr/>
-        </p:nvSpPr>
-        <p:spPr>
-          <a:xfrm>
-            <a:off x="6386440" y="5266202"/>
-            <a:ext cx="146192" cy="206531"/>
-          </a:xfrm>
-          <a:prstGeom prst="rect">
-            <a:avLst/>
-          </a:prstGeom>
-          <a:noFill/>
-          <a:effectLst/>
-        </p:spPr>
-        <p:txBody>
-          <a:bodyPr wrap="square" lIns="82296" tIns="41148" rIns="82296" bIns="41148" rtlCol="0">
-            <a:spAutoFit/>
-          </a:bodyPr>
-          <a:lstStyle/>
-          <a:p>
-            <a:r>
-              <a:rPr lang="en-US" sz="810" b="1" dirty="0">
-                <a:solidFill>
-                  <a:schemeClr val="tx1"/>
-                </a:solidFill>
-                <a:latin typeface="Trebuchet MS"/>
-                <a:cs typeface="Trebuchet MS"/>
-              </a:rPr>
-              <a:t>2</a:t>
-            </a:r>
-          </a:p>
-        </p:txBody>
-      </p:sp>
-      <p:sp>
-        <p:nvSpPr>
           <p:cNvPr id="41" name="TextBox 40"/>
           <p:cNvSpPr txBox="1"/>
           <p:nvPr/>
@@ -4480,78 +3940,6 @@
         <p:spPr>
           <a:xfrm>
             <a:off x="9138672" y="4458298"/>
-            <a:ext cx="146192" cy="206531"/>
-          </a:xfrm>
-          <a:prstGeom prst="rect">
-            <a:avLst/>
-          </a:prstGeom>
-          <a:noFill/>
-          <a:effectLst/>
-        </p:spPr>
-        <p:txBody>
-          <a:bodyPr wrap="square" lIns="82296" tIns="41148" rIns="82296" bIns="41148" rtlCol="0">
-            <a:spAutoFit/>
-          </a:bodyPr>
-          <a:lstStyle/>
-          <a:p>
-            <a:r>
-              <a:rPr lang="en-US" sz="810" b="1" dirty="0">
-                <a:solidFill>
-                  <a:schemeClr val="tx1"/>
-                </a:solidFill>
-                <a:latin typeface="Trebuchet MS"/>
-                <a:cs typeface="Trebuchet MS"/>
-              </a:rPr>
-              <a:t>1</a:t>
-            </a:r>
-          </a:p>
-        </p:txBody>
-      </p:sp>
-      <p:sp>
-        <p:nvSpPr>
-          <p:cNvPr id="43" name="TextBox 42"/>
-          <p:cNvSpPr txBox="1"/>
-          <p:nvPr/>
-        </p:nvSpPr>
-        <p:spPr>
-          <a:xfrm>
-            <a:off x="6395472" y="4511822"/>
-            <a:ext cx="146192" cy="206531"/>
-          </a:xfrm>
-          <a:prstGeom prst="rect">
-            <a:avLst/>
-          </a:prstGeom>
-          <a:noFill/>
-          <a:effectLst/>
-        </p:spPr>
-        <p:txBody>
-          <a:bodyPr wrap="square" lIns="82296" tIns="41148" rIns="82296" bIns="41148" rtlCol="0">
-            <a:spAutoFit/>
-          </a:bodyPr>
-          <a:lstStyle/>
-          <a:p>
-            <a:r>
-              <a:rPr lang="en-US" sz="810" b="1" dirty="0">
-                <a:solidFill>
-                  <a:schemeClr val="tx1"/>
-                </a:solidFill>
-                <a:latin typeface="Trebuchet MS"/>
-                <a:cs typeface="Trebuchet MS"/>
-              </a:rPr>
-              <a:t>1</a:t>
-            </a:r>
-          </a:p>
-        </p:txBody>
-      </p:sp>
-      <p:sp>
-        <p:nvSpPr>
-          <p:cNvPr id="44" name="TextBox 43"/>
-          <p:cNvSpPr txBox="1"/>
-          <p:nvPr/>
-        </p:nvSpPr>
-        <p:spPr>
-          <a:xfrm>
-            <a:off x="6395472" y="3690871"/>
             <a:ext cx="146192" cy="206531"/>
           </a:xfrm>
           <a:prstGeom prst="rect">
@@ -4955,7 +4343,7 @@
           <a:p>
             <a:pPr algn="ctr"/>
             <a:r>
-              <a:rPr lang="en-US" sz="1260" b="1" dirty="0" smtClean="0">
+              <a:rPr lang="en-US" sz="1260" b="1" dirty="0">
                 <a:solidFill>
                   <a:schemeClr val="tx1"/>
                 </a:solidFill>
@@ -4964,13 +4352,6 @@
               </a:rPr>
               <a:t>skin</a:t>
             </a:r>
-            <a:endParaRPr lang="en-US" sz="1260" b="1" dirty="0">
-              <a:solidFill>
-                <a:schemeClr val="tx1"/>
-              </a:solidFill>
-              <a:latin typeface="Trebuchet MS"/>
-              <a:cs typeface="Trebuchet MS"/>
-            </a:endParaRPr>
           </a:p>
         </p:txBody>
       </p:sp>
@@ -5022,7 +4403,7 @@
           <a:p>
             <a:pPr algn="ctr"/>
             <a:r>
-              <a:rPr lang="en-US" sz="1260" b="1" dirty="0" smtClean="0">
+              <a:rPr lang="en-US" sz="1260" b="1" dirty="0">
                 <a:solidFill>
                   <a:schemeClr val="tx1"/>
                 </a:solidFill>
@@ -5031,13 +4412,6 @@
               </a:rPr>
               <a:t>animation</a:t>
             </a:r>
-            <a:endParaRPr lang="en-US" sz="1260" b="1" dirty="0">
-              <a:solidFill>
-                <a:schemeClr val="tx1"/>
-              </a:solidFill>
-              <a:latin typeface="Trebuchet MS"/>
-              <a:cs typeface="Trebuchet MS"/>
-            </a:endParaRPr>
           </a:p>
         </p:txBody>
       </p:sp>
@@ -5242,13 +4616,6 @@
   <p:transition spd="slow">
     <p:strips dir="rd"/>
   </p:transition>
-  <p:timing>
-    <p:tnLst>
-      <p:par>
-        <p:cTn id="1" dur="indefinite" restart="never" nodeType="tmRoot"/>
-      </p:par>
-    </p:tnLst>
-  </p:timing>
 </p:sld>
 </file>
 
@@ -5269,8 +4636,8 @@
           <a:chExt cx="0" cy="0"/>
         </a:xfrm>
       </p:grpSpPr>
-      <mc:AlternateContent xmlns:mc="http://schemas.openxmlformats.org/markup-compatibility/2006">
-        <mc:Choice xmlns:a14="http://schemas.microsoft.com/office/drawing/2010/main" Requires="a14">
+      <mc:AlternateContent xmlns:mc="http://schemas.openxmlformats.org/markup-compatibility/2006" xmlns:a14="http://schemas.microsoft.com/office/drawing/2010/main">
+        <mc:Choice Requires="a14">
           <p:sp>
             <p:nvSpPr>
               <p:cNvPr id="4" name="Прямоугольник 3"/>
@@ -5292,6 +4659,7 @@
               </a:bodyPr>
               <a:lstStyle/>
               <a:p>
+                <a:pPr/>
                 <a14:m>
                   <m:oMathPara xmlns:m="http://schemas.openxmlformats.org/officeDocument/2006/math">
                     <m:oMathParaPr>
@@ -5301,7 +4669,7 @@
                       <m:d>
                         <m:dPr>
                           <m:ctrlPr>
-                            <a:rPr lang="ru-RU" smtClean="0">
+                            <a:rPr lang="ru-RU" i="1" smtClean="0">
                               <a:solidFill>
                                 <a:schemeClr val="tx1"/>
                               </a:solidFill>
@@ -5321,7 +4689,7 @@
                                 </m:mc>
                               </m:mcs>
                               <m:ctrlPr>
-                                <a:rPr lang="ru-RU">
+                                <a:rPr lang="ru-RU" i="1">
                                   <a:solidFill>
                                     <a:schemeClr val="tx1"/>
                                   </a:solidFill>
@@ -5334,7 +4702,7 @@
                                 <m:f>
                                   <m:fPr>
                                     <m:ctrlPr>
-                                      <a:rPr lang="ru-RU">
+                                      <a:rPr lang="ru-RU" i="1">
                                         <a:solidFill>
                                           <a:schemeClr val="tx1"/>
                                         </a:solidFill>
@@ -5814,7 +5182,7 @@
             </p:txBody>
           </p:sp>
         </mc:Choice>
-        <mc:Fallback>
+        <mc:Fallback xmlns="">
           <p:sp>
             <p:nvSpPr>
               <p:cNvPr id="4" name="Прямоугольник 3"/>
@@ -5853,8 +5221,8 @@
           </p:sp>
         </mc:Fallback>
       </mc:AlternateContent>
-      <mc:AlternateContent xmlns:mc="http://schemas.openxmlformats.org/markup-compatibility/2006">
-        <mc:Choice xmlns:a14="http://schemas.microsoft.com/office/drawing/2010/main" Requires="a14">
+      <mc:AlternateContent xmlns:mc="http://schemas.openxmlformats.org/markup-compatibility/2006" xmlns:a14="http://schemas.microsoft.com/office/drawing/2010/main">
+        <mc:Choice Requires="a14">
           <p:sp>
             <p:nvSpPr>
               <p:cNvPr id="5" name="Прямоугольник 4"/>
@@ -5876,6 +5244,7 @@
               </a:bodyPr>
               <a:lstStyle/>
               <a:p>
+                <a:pPr/>
                 <a14:m>
                   <m:oMathPara xmlns:m="http://schemas.openxmlformats.org/officeDocument/2006/math">
                     <m:oMathParaPr>
@@ -5885,7 +5254,7 @@
                       <m:d>
                         <m:dPr>
                           <m:ctrlPr>
-                            <a:rPr lang="ru-RU" smtClean="0">
+                            <a:rPr lang="ru-RU" i="1" smtClean="0">
                               <a:solidFill>
                                 <a:schemeClr val="tx1"/>
                               </a:solidFill>
@@ -5905,7 +5274,7 @@
                                 </m:mc>
                               </m:mcs>
                               <m:ctrlPr>
-                                <a:rPr lang="ru-RU">
+                                <a:rPr lang="ru-RU" i="1">
                                   <a:solidFill>
                                     <a:schemeClr val="tx1"/>
                                   </a:solidFill>
@@ -5918,7 +5287,7 @@
                                 <m:f>
                                   <m:fPr>
                                     <m:ctrlPr>
-                                      <a:rPr lang="ru-RU">
+                                      <a:rPr lang="ru-RU" i="1">
                                         <a:solidFill>
                                           <a:schemeClr val="tx1"/>
                                         </a:solidFill>
@@ -6294,7 +5663,7 @@
             </p:txBody>
           </p:sp>
         </mc:Choice>
-        <mc:Fallback>
+        <mc:Fallback xmlns="">
           <p:sp>
             <p:nvSpPr>
               <p:cNvPr id="5" name="Прямоугольник 4"/>
@@ -6333,8 +5702,8 @@
           </p:sp>
         </mc:Fallback>
       </mc:AlternateContent>
-      <mc:AlternateContent xmlns:mc="http://schemas.openxmlformats.org/markup-compatibility/2006">
-        <mc:Choice xmlns:a14="http://schemas.microsoft.com/office/drawing/2010/main" Requires="a14">
+      <mc:AlternateContent xmlns:mc="http://schemas.openxmlformats.org/markup-compatibility/2006" xmlns:a14="http://schemas.microsoft.com/office/drawing/2010/main">
+        <mc:Choice Requires="a14">
           <p:sp>
             <p:nvSpPr>
               <p:cNvPr id="6" name="Прямоугольник 5"/>
@@ -6356,6 +5725,7 @@
               </a:bodyPr>
               <a:lstStyle/>
               <a:p>
+                <a:pPr/>
                 <a14:m>
                   <m:oMathPara xmlns:m="http://schemas.openxmlformats.org/officeDocument/2006/math">
                     <m:oMathParaPr>
@@ -6365,7 +5735,7 @@
                       <m:d>
                         <m:dPr>
                           <m:ctrlPr>
-                            <a:rPr lang="ru-RU" smtClean="0">
+                            <a:rPr lang="ru-RU" i="1" smtClean="0">
                               <a:solidFill>
                                 <a:schemeClr val="tx1"/>
                               </a:solidFill>
@@ -6385,7 +5755,7 @@
                                 </m:mc>
                               </m:mcs>
                               <m:ctrlPr>
-                                <a:rPr lang="ru-RU">
+                                <a:rPr lang="ru-RU" i="1">
                                   <a:solidFill>
                                     <a:schemeClr val="tx1"/>
                                   </a:solidFill>
@@ -6398,7 +5768,7 @@
                                 <m:f>
                                   <m:fPr>
                                     <m:ctrlPr>
-                                      <a:rPr lang="ru-RU">
+                                      <a:rPr lang="ru-RU" i="1">
                                         <a:solidFill>
                                           <a:schemeClr val="tx1"/>
                                         </a:solidFill>
@@ -6746,7 +6116,7 @@
             </p:txBody>
           </p:sp>
         </mc:Choice>
-        <mc:Fallback>
+        <mc:Fallback xmlns="">
           <p:sp>
             <p:nvSpPr>
               <p:cNvPr id="6" name="Прямоугольник 5"/>
@@ -6789,6 +6159,87 @@
     <p:extLst>
       <p:ext uri="{BB962C8B-B14F-4D97-AF65-F5344CB8AC3E}">
         <p14:creationId xmlns:p14="http://schemas.microsoft.com/office/powerpoint/2010/main" val="2400906542"/>
+      </p:ext>
+    </p:extLst>
+  </p:cSld>
+  <p:clrMapOvr>
+    <a:masterClrMapping/>
+  </p:clrMapOvr>
+  <p:transition>
+    <p:fade/>
+  </p:transition>
+</p:sld>
+</file>
+
+<file path=ppt/slides/slide4.xml><?xml version="1.0" encoding="utf-8"?>
+<p:sld xmlns:a="http://schemas.openxmlformats.org/drawingml/2006/main" xmlns:r="http://schemas.openxmlformats.org/officeDocument/2006/relationships" xmlns:p="http://schemas.openxmlformats.org/presentationml/2006/main">
+  <p:cSld>
+    <p:spTree>
+      <p:nvGrpSpPr>
+        <p:cNvPr id="1" name=""/>
+        <p:cNvGrpSpPr/>
+        <p:nvPr/>
+      </p:nvGrpSpPr>
+      <p:grpSpPr>
+        <a:xfrm>
+          <a:off x="0" y="0"/>
+          <a:ext cx="0" cy="0"/>
+          <a:chOff x="0" y="0"/>
+          <a:chExt cx="0" cy="0"/>
+        </a:xfrm>
+      </p:grpSpPr>
+      <p:sp>
+        <p:nvSpPr>
+          <p:cNvPr id="2" name="Title 1"/>
+          <p:cNvSpPr>
+            <a:spLocks noGrp="1"/>
+          </p:cNvSpPr>
+          <p:nvPr>
+            <p:ph type="title"/>
+          </p:nvPr>
+        </p:nvSpPr>
+        <p:spPr/>
+        <p:txBody>
+          <a:bodyPr/>
+          <a:lstStyle/>
+          <a:p>
+            <a:r>
+              <a:rPr lang="en-US" dirty="0" err="1"/>
+              <a:t>Todo</a:t>
+            </a:r>
+            <a:r>
+              <a:rPr lang="en-US" dirty="0"/>
+              <a:t> Add BRDF Equations</a:t>
+            </a:r>
+          </a:p>
+        </p:txBody>
+      </p:sp>
+      <p:sp>
+        <p:nvSpPr>
+          <p:cNvPr id="3" name="Content Placeholder 2"/>
+          <p:cNvSpPr>
+            <a:spLocks noGrp="1"/>
+          </p:cNvSpPr>
+          <p:nvPr>
+            <p:ph idx="1"/>
+          </p:nvPr>
+        </p:nvSpPr>
+        <p:spPr/>
+        <p:txBody>
+          <a:bodyPr/>
+          <a:lstStyle/>
+          <a:p>
+            <a:r>
+              <a:rPr lang="en-US"/>
+              <a:t>https://github.com/KhronosGroup/glTF/issues/810</a:t>
+            </a:r>
+          </a:p>
+        </p:txBody>
+      </p:sp>
+    </p:spTree>
+    <p:extLst>
+      <p:ext uri="{BB962C8B-B14F-4D97-AF65-F5344CB8AC3E}">
+        <p14:creationId xmlns:p14="http://schemas.microsoft.com/office/powerpoint/2010/main" val="3223897390"/>
       </p:ext>
     </p:extLst>
   </p:cSld>

</xml_diff>

<commit_message>
Moved materials description out of property. Updated materials property to match schema and rest of the properties.
</commit_message>
<xml_diff>
--- a/specification/2.0/figures/pptx/figures.pptx
+++ b/specification/2.0/figures/pptx/figures.pptx
@@ -5,16 +5,15 @@
     <p:sldMasterId id="2147483728" r:id="rId1"/>
   </p:sldMasterIdLst>
   <p:notesMasterIdLst>
-    <p:notesMasterId r:id="rId6"/>
+    <p:notesMasterId r:id="rId5"/>
   </p:notesMasterIdLst>
   <p:handoutMasterIdLst>
-    <p:handoutMasterId r:id="rId7"/>
+    <p:handoutMasterId r:id="rId6"/>
   </p:handoutMasterIdLst>
   <p:sldIdLst>
     <p:sldId id="3181" r:id="rId2"/>
     <p:sldId id="3168" r:id="rId3"/>
     <p:sldId id="3182" r:id="rId4"/>
-    <p:sldId id="3183" r:id="rId5"/>
   </p:sldIdLst>
   <p:sldSz cx="10972800" cy="6172200"/>
   <p:notesSz cx="6858000" cy="9144000"/>
@@ -310,7 +309,7 @@
               <a:pPr>
                 <a:defRPr/>
               </a:pPr>
-              <a:t>2/3/2017</a:t>
+              <a:t>2/13/2017</a:t>
             </a:fld>
             <a:endParaRPr lang="en-US"/>
           </a:p>
@@ -526,7 +525,7 @@
               <a:pPr>
                 <a:defRPr/>
               </a:pPr>
-              <a:t>2/3/2017</a:t>
+              <a:t>2/13/2017</a:t>
             </a:fld>
             <a:endParaRPr lang="en-US"/>
           </a:p>
@@ -6171,87 +6170,6 @@
 </p:sld>
 </file>
 
-<file path=ppt/slides/slide4.xml><?xml version="1.0" encoding="utf-8"?>
-<p:sld xmlns:a="http://schemas.openxmlformats.org/drawingml/2006/main" xmlns:r="http://schemas.openxmlformats.org/officeDocument/2006/relationships" xmlns:p="http://schemas.openxmlformats.org/presentationml/2006/main">
-  <p:cSld>
-    <p:spTree>
-      <p:nvGrpSpPr>
-        <p:cNvPr id="1" name=""/>
-        <p:cNvGrpSpPr/>
-        <p:nvPr/>
-      </p:nvGrpSpPr>
-      <p:grpSpPr>
-        <a:xfrm>
-          <a:off x="0" y="0"/>
-          <a:ext cx="0" cy="0"/>
-          <a:chOff x="0" y="0"/>
-          <a:chExt cx="0" cy="0"/>
-        </a:xfrm>
-      </p:grpSpPr>
-      <p:sp>
-        <p:nvSpPr>
-          <p:cNvPr id="2" name="Title 1"/>
-          <p:cNvSpPr>
-            <a:spLocks noGrp="1"/>
-          </p:cNvSpPr>
-          <p:nvPr>
-            <p:ph type="title"/>
-          </p:nvPr>
-        </p:nvSpPr>
-        <p:spPr/>
-        <p:txBody>
-          <a:bodyPr/>
-          <a:lstStyle/>
-          <a:p>
-            <a:r>
-              <a:rPr lang="en-US" dirty="0" err="1"/>
-              <a:t>Todo</a:t>
-            </a:r>
-            <a:r>
-              <a:rPr lang="en-US" dirty="0"/>
-              <a:t> Add BRDF Equations</a:t>
-            </a:r>
-          </a:p>
-        </p:txBody>
-      </p:sp>
-      <p:sp>
-        <p:nvSpPr>
-          <p:cNvPr id="3" name="Content Placeholder 2"/>
-          <p:cNvSpPr>
-            <a:spLocks noGrp="1"/>
-          </p:cNvSpPr>
-          <p:nvPr>
-            <p:ph idx="1"/>
-          </p:nvPr>
-        </p:nvSpPr>
-        <p:spPr/>
-        <p:txBody>
-          <a:bodyPr/>
-          <a:lstStyle/>
-          <a:p>
-            <a:r>
-              <a:rPr lang="en-US"/>
-              <a:t>https://github.com/KhronosGroup/glTF/issues/810</a:t>
-            </a:r>
-          </a:p>
-        </p:txBody>
-      </p:sp>
-    </p:spTree>
-    <p:extLst>
-      <p:ext uri="{BB962C8B-B14F-4D97-AF65-F5344CB8AC3E}">
-        <p14:creationId xmlns:p14="http://schemas.microsoft.com/office/powerpoint/2010/main" val="3223897390"/>
-      </p:ext>
-    </p:extLst>
-  </p:cSld>
-  <p:clrMapOvr>
-    <a:masterClrMapping/>
-  </p:clrMapOvr>
-  <p:transition>
-    <p:fade/>
-  </p:transition>
-</p:sld>
-</file>
-
 <file path=ppt/theme/theme1.xml><?xml version="1.0" encoding="utf-8"?>
 <a:theme xmlns:a="http://schemas.openxmlformats.org/drawingml/2006/main" name="Khronos">
   <a:themeElements>

</xml_diff>

<commit_message>
Uupdated to 1 node per mesh, 1 accessor per skin.
The font in this PPT export is a little heavier than in the .png being
replaced; perhaps because I'm on a Mac. I'm not sure which I prefer; let
me know if anybody prefers the older, lighter look.
</commit_message>
<xml_diff>
--- a/specification/2.0/figures/pptx/figures.pptx
+++ b/specification/2.0/figures/pptx/figures.pptx
@@ -309,7 +309,7 @@
               <a:pPr>
                 <a:defRPr/>
               </a:pPr>
-              <a:t>2/13/2017</a:t>
+              <a:t>12/7/17</a:t>
             </a:fld>
             <a:endParaRPr lang="en-US"/>
           </a:p>
@@ -525,7 +525,7 @@
               <a:pPr>
                 <a:defRPr/>
               </a:pPr>
-              <a:t>2/13/2017</a:t>
+              <a:t>12/7/17</a:t>
             </a:fld>
             <a:endParaRPr lang="en-US"/>
           </a:p>
@@ -4098,15 +4098,22 @@
           <a:lstStyle/>
           <a:p>
             <a:r>
-              <a:rPr lang="en-US" sz="810" b="1" dirty="0">
+              <a:rPr lang="en-US" sz="810" b="1" dirty="0" smtClean="0">
                 <a:solidFill>
                   <a:schemeClr val="tx1"/>
                 </a:solidFill>
                 <a:latin typeface="Trebuchet MS"/>
                 <a:cs typeface="Trebuchet MS"/>
               </a:rPr>
-              <a:t>*</a:t>
+              <a:t>1</a:t>
             </a:r>
+            <a:endParaRPr lang="en-US" sz="810" b="1" dirty="0">
+              <a:solidFill>
+                <a:schemeClr val="tx1"/>
+              </a:solidFill>
+              <a:latin typeface="Trebuchet MS"/>
+              <a:cs typeface="Trebuchet MS"/>
+            </a:endParaRPr>
           </a:p>
         </p:txBody>
       </p:sp>
@@ -4267,7 +4274,7 @@
         <p:spPr>
           <a:xfrm>
             <a:off x="4445114" y="3071642"/>
-            <a:ext cx="145485" cy="206531"/>
+            <a:ext cx="145485" cy="329962"/>
           </a:xfrm>
           <a:prstGeom prst="rect">
             <a:avLst/>
@@ -4282,15 +4289,22 @@
           <a:lstStyle/>
           <a:p>
             <a:r>
-              <a:rPr lang="en-US" sz="810" b="1" dirty="0">
+              <a:rPr lang="en-US" sz="810" b="1" dirty="0" smtClean="0">
                 <a:solidFill>
                   <a:schemeClr val="tx1"/>
                 </a:solidFill>
                 <a:latin typeface="Trebuchet MS"/>
                 <a:cs typeface="Trebuchet MS"/>
               </a:rPr>
-              <a:t>*</a:t>
+              <a:t>1	</a:t>
             </a:r>
+            <a:endParaRPr lang="en-US" sz="810" b="1" dirty="0">
+              <a:solidFill>
+                <a:schemeClr val="tx1"/>
+              </a:solidFill>
+              <a:latin typeface="Trebuchet MS"/>
+              <a:cs typeface="Trebuchet MS"/>
+            </a:endParaRPr>
           </a:p>
         </p:txBody>
       </p:sp>
@@ -4615,6 +4629,13 @@
   <p:transition spd="slow">
     <p:strips dir="rd"/>
   </p:transition>
+  <p:timing>
+    <p:tnLst>
+      <p:par>
+        <p:cTn id="1" dur="indefinite" restart="never" nodeType="tmRoot"/>
+      </p:par>
+    </p:tnLst>
+  </p:timing>
 </p:sld>
 </file>
 
@@ -4672,7 +4693,7 @@
                               <a:solidFill>
                                 <a:schemeClr val="tx1"/>
                               </a:solidFill>
-                              <a:latin typeface="Cambria Math" panose="02040503050406030204" pitchFamily="18" charset="0"/>
+                              <a:latin typeface="Cambria Math" charset="0"/>
                             </a:rPr>
                           </m:ctrlPr>
                         </m:dPr>
@@ -4692,7 +4713,7 @@
                                   <a:solidFill>
                                     <a:schemeClr val="tx1"/>
                                   </a:solidFill>
-                                  <a:latin typeface="Cambria Math" panose="02040503050406030204" pitchFamily="18" charset="0"/>
+                                  <a:latin typeface="Cambria Math" charset="0"/>
                                 </a:rPr>
                               </m:ctrlPr>
                             </m:mPr>
@@ -4705,7 +4726,7 @@
                                         <a:solidFill>
                                           <a:schemeClr val="tx1"/>
                                         </a:solidFill>
-                                        <a:latin typeface="Cambria Math" panose="02040503050406030204" pitchFamily="18" charset="0"/>
+                                        <a:latin typeface="Cambria Math" charset="0"/>
                                       </a:rPr>
                                     </m:ctrlPr>
                                   </m:fPr>
@@ -4728,7 +4749,7 @@
                                             <a:solidFill>
                                               <a:schemeClr val="tx1"/>
                                             </a:solidFill>
-                                            <a:latin typeface="Cambria Math" panose="02040503050406030204" pitchFamily="18" charset="0"/>
+                                            <a:latin typeface="Cambria Math" charset="0"/>
                                           </a:rPr>
                                         </m:ctrlPr>
                                       </m:funcPr>
@@ -4775,7 +4796,7 @@
                                                 <a:solidFill>
                                                   <a:schemeClr val="tx1"/>
                                                 </a:solidFill>
-                                                <a:latin typeface="Cambria Math" panose="02040503050406030204" pitchFamily="18" charset="0"/>
+                                                <a:latin typeface="Cambria Math" charset="0"/>
                                               </a:rPr>
                                             </m:ctrlPr>
                                           </m:dPr>
@@ -4859,7 +4880,7 @@
                                         <a:solidFill>
                                           <a:schemeClr val="tx1"/>
                                         </a:solidFill>
-                                        <a:latin typeface="Cambria Math" panose="02040503050406030204" pitchFamily="18" charset="0"/>
+                                        <a:latin typeface="Cambria Math" charset="0"/>
                                       </a:rPr>
                                     </m:ctrlPr>
                                   </m:fPr>
@@ -4882,7 +4903,7 @@
                                             <a:solidFill>
                                               <a:schemeClr val="tx1"/>
                                             </a:solidFill>
-                                            <a:latin typeface="Cambria Math" panose="02040503050406030204" pitchFamily="18" charset="0"/>
+                                            <a:latin typeface="Cambria Math" charset="0"/>
                                           </a:rPr>
                                         </m:ctrlPr>
                                       </m:funcPr>
@@ -4908,7 +4929,7 @@
                                                 <a:solidFill>
                                                   <a:schemeClr val="tx1"/>
                                                 </a:solidFill>
-                                                <a:latin typeface="Cambria Math" panose="02040503050406030204" pitchFamily="18" charset="0"/>
+                                                <a:latin typeface="Cambria Math" charset="0"/>
                                               </a:rPr>
                                             </m:ctrlPr>
                                           </m:dPr>
@@ -4992,7 +5013,7 @@
                                         <a:solidFill>
                                           <a:schemeClr val="tx1"/>
                                         </a:solidFill>
-                                        <a:latin typeface="Cambria Math" panose="02040503050406030204" pitchFamily="18" charset="0"/>
+                                        <a:latin typeface="Cambria Math" charset="0"/>
                                       </a:rPr>
                                     </m:ctrlPr>
                                   </m:fPr>
@@ -5064,7 +5085,7 @@
                                         <a:solidFill>
                                           <a:schemeClr val="tx1"/>
                                         </a:solidFill>
-                                        <a:latin typeface="Cambria Math" panose="02040503050406030204" pitchFamily="18" charset="0"/>
+                                        <a:latin typeface="Cambria Math" charset="0"/>
                                       </a:rPr>
                                     </m:ctrlPr>
                                   </m:fPr>
@@ -5257,7 +5278,7 @@
                               <a:solidFill>
                                 <a:schemeClr val="tx1"/>
                               </a:solidFill>
-                              <a:latin typeface="Cambria Math" panose="02040503050406030204" pitchFamily="18" charset="0"/>
+                              <a:latin typeface="Cambria Math" charset="0"/>
                             </a:rPr>
                           </m:ctrlPr>
                         </m:dPr>
@@ -5277,7 +5298,7 @@
                                   <a:solidFill>
                                     <a:schemeClr val="tx1"/>
                                   </a:solidFill>
-                                  <a:latin typeface="Cambria Math" panose="02040503050406030204" pitchFamily="18" charset="0"/>
+                                  <a:latin typeface="Cambria Math" charset="0"/>
                                 </a:rPr>
                               </m:ctrlPr>
                             </m:mPr>
@@ -5290,7 +5311,7 @@
                                         <a:solidFill>
                                           <a:schemeClr val="tx1"/>
                                         </a:solidFill>
-                                        <a:latin typeface="Cambria Math" panose="02040503050406030204" pitchFamily="18" charset="0"/>
+                                        <a:latin typeface="Cambria Math" charset="0"/>
                                       </a:rPr>
                                     </m:ctrlPr>
                                   </m:fPr>
@@ -5313,7 +5334,7 @@
                                             <a:solidFill>
                                               <a:schemeClr val="tx1"/>
                                             </a:solidFill>
-                                            <a:latin typeface="Cambria Math" panose="02040503050406030204" pitchFamily="18" charset="0"/>
+                                            <a:latin typeface="Cambria Math" charset="0"/>
                                           </a:rPr>
                                         </m:ctrlPr>
                                       </m:funcPr>
@@ -5360,7 +5381,7 @@
                                                 <a:solidFill>
                                                   <a:schemeClr val="tx1"/>
                                                 </a:solidFill>
-                                                <a:latin typeface="Cambria Math" panose="02040503050406030204" pitchFamily="18" charset="0"/>
+                                                <a:latin typeface="Cambria Math" charset="0"/>
                                               </a:rPr>
                                             </m:ctrlPr>
                                           </m:dPr>
@@ -5444,7 +5465,7 @@
                                         <a:solidFill>
                                           <a:schemeClr val="tx1"/>
                                         </a:solidFill>
-                                        <a:latin typeface="Cambria Math" panose="02040503050406030204" pitchFamily="18" charset="0"/>
+                                        <a:latin typeface="Cambria Math" charset="0"/>
                                       </a:rPr>
                                     </m:ctrlPr>
                                   </m:fPr>
@@ -5467,7 +5488,7 @@
                                             <a:solidFill>
                                               <a:schemeClr val="tx1"/>
                                             </a:solidFill>
-                                            <a:latin typeface="Cambria Math" panose="02040503050406030204" pitchFamily="18" charset="0"/>
+                                            <a:latin typeface="Cambria Math" charset="0"/>
                                           </a:rPr>
                                         </m:ctrlPr>
                                       </m:funcPr>
@@ -5493,7 +5514,7 @@
                                                 <a:solidFill>
                                                   <a:schemeClr val="tx1"/>
                                                 </a:solidFill>
-                                                <a:latin typeface="Cambria Math" panose="02040503050406030204" pitchFamily="18" charset="0"/>
+                                                <a:latin typeface="Cambria Math" charset="0"/>
                                               </a:rPr>
                                             </m:ctrlPr>
                                           </m:dPr>
@@ -5738,7 +5759,7 @@
                               <a:solidFill>
                                 <a:schemeClr val="tx1"/>
                               </a:solidFill>
-                              <a:latin typeface="Cambria Math" panose="02040503050406030204" pitchFamily="18" charset="0"/>
+                              <a:latin typeface="Cambria Math" charset="0"/>
                             </a:rPr>
                           </m:ctrlPr>
                         </m:dPr>
@@ -5758,7 +5779,7 @@
                                   <a:solidFill>
                                     <a:schemeClr val="tx1"/>
                                   </a:solidFill>
-                                  <a:latin typeface="Cambria Math" panose="02040503050406030204" pitchFamily="18" charset="0"/>
+                                  <a:latin typeface="Cambria Math" charset="0"/>
                                 </a:rPr>
                               </m:ctrlPr>
                             </m:mPr>
@@ -5771,7 +5792,7 @@
                                         <a:solidFill>
                                           <a:schemeClr val="tx1"/>
                                         </a:solidFill>
-                                        <a:latin typeface="Cambria Math" panose="02040503050406030204" pitchFamily="18" charset="0"/>
+                                        <a:latin typeface="Cambria Math" charset="0"/>
                                       </a:rPr>
                                     </m:ctrlPr>
                                   </m:fPr>
@@ -5853,7 +5874,7 @@
                                         <a:solidFill>
                                           <a:schemeClr val="tx1"/>
                                         </a:solidFill>
-                                        <a:latin typeface="Cambria Math" panose="02040503050406030204" pitchFamily="18" charset="0"/>
+                                        <a:latin typeface="Cambria Math" charset="0"/>
                                       </a:rPr>
                                     </m:ctrlPr>
                                   </m:fPr>
@@ -5935,7 +5956,7 @@
                                         <a:solidFill>
                                           <a:schemeClr val="tx1"/>
                                         </a:solidFill>
-                                        <a:latin typeface="Cambria Math" panose="02040503050406030204" pitchFamily="18" charset="0"/>
+                                        <a:latin typeface="Cambria Math" charset="0"/>
                                       </a:rPr>
                                     </m:ctrlPr>
                                   </m:fPr>
@@ -5989,7 +6010,7 @@
                                         <a:solidFill>
                                           <a:schemeClr val="tx1"/>
                                         </a:solidFill>
-                                        <a:latin typeface="Cambria Math" panose="02040503050406030204" pitchFamily="18" charset="0"/>
+                                        <a:latin typeface="Cambria Math" charset="0"/>
                                       </a:rPr>
                                     </m:ctrlPr>
                                   </m:fPr>

</xml_diff>